<commit_message>
Few last minute changes plus saving the invoice.pdf
</commit_message>
<xml_diff>
--- a/acqwire-document-IV.pptx
+++ b/acqwire-document-IV.pptx
@@ -11,9 +11,8 @@
     <p:sldId id="258" r:id="rId5"/>
     <p:sldId id="257" r:id="rId6"/>
     <p:sldId id="263" r:id="rId7"/>
-    <p:sldId id="262" r:id="rId8"/>
-    <p:sldId id="261" r:id="rId9"/>
-    <p:sldId id="264" r:id="rId10"/>
+    <p:sldId id="261" r:id="rId8"/>
+    <p:sldId id="264" r:id="rId9"/>
   </p:sldIdLst>
   <p:sldSz cx="12192000" cy="6858000"/>
   <p:notesSz cx="6858000" cy="9144000"/>
@@ -112,6 +111,11 @@
       </a:defRPr>
     </a:lvl9pPr>
   </p:defaultTextStyle>
+  <p:extLst>
+    <p:ext uri="{EFAFB233-063F-42B5-8137-9DF3F51BA10A}">
+      <p15:sldGuideLst xmlns:p15="http://schemas.microsoft.com/office/powerpoint/2012/main"/>
+    </p:ext>
+  </p:extLst>
 </p:presentation>
 </file>
 
@@ -246,7 +250,7 @@
           <a:p>
             <a:fld id="{1E7D160D-1039-4FD1-888D-FE7CCB4BB5CF}" type="datetimeFigureOut">
               <a:rPr lang="en-US" smtClean="0"/>
-              <a:t>7/27/2020</a:t>
+              <a:t>7/28/2020</a:t>
             </a:fld>
             <a:endParaRPr lang="en-US"/>
           </a:p>
@@ -416,7 +420,7 @@
           <a:p>
             <a:fld id="{1E7D160D-1039-4FD1-888D-FE7CCB4BB5CF}" type="datetimeFigureOut">
               <a:rPr lang="en-US" smtClean="0"/>
-              <a:t>7/27/2020</a:t>
+              <a:t>7/28/2020</a:t>
             </a:fld>
             <a:endParaRPr lang="en-US"/>
           </a:p>
@@ -596,7 +600,7 @@
           <a:p>
             <a:fld id="{1E7D160D-1039-4FD1-888D-FE7CCB4BB5CF}" type="datetimeFigureOut">
               <a:rPr lang="en-US" smtClean="0"/>
-              <a:t>7/27/2020</a:t>
+              <a:t>7/28/2020</a:t>
             </a:fld>
             <a:endParaRPr lang="en-US"/>
           </a:p>
@@ -766,7 +770,7 @@
           <a:p>
             <a:fld id="{1E7D160D-1039-4FD1-888D-FE7CCB4BB5CF}" type="datetimeFigureOut">
               <a:rPr lang="en-US" smtClean="0"/>
-              <a:t>7/27/2020</a:t>
+              <a:t>7/28/2020</a:t>
             </a:fld>
             <a:endParaRPr lang="en-US"/>
           </a:p>
@@ -1012,7 +1016,7 @@
           <a:p>
             <a:fld id="{1E7D160D-1039-4FD1-888D-FE7CCB4BB5CF}" type="datetimeFigureOut">
               <a:rPr lang="en-US" smtClean="0"/>
-              <a:t>7/27/2020</a:t>
+              <a:t>7/28/2020</a:t>
             </a:fld>
             <a:endParaRPr lang="en-US"/>
           </a:p>
@@ -1244,7 +1248,7 @@
           <a:p>
             <a:fld id="{1E7D160D-1039-4FD1-888D-FE7CCB4BB5CF}" type="datetimeFigureOut">
               <a:rPr lang="en-US" smtClean="0"/>
-              <a:t>7/27/2020</a:t>
+              <a:t>7/28/2020</a:t>
             </a:fld>
             <a:endParaRPr lang="en-US"/>
           </a:p>
@@ -1611,7 +1615,7 @@
           <a:p>
             <a:fld id="{1E7D160D-1039-4FD1-888D-FE7CCB4BB5CF}" type="datetimeFigureOut">
               <a:rPr lang="en-US" smtClean="0"/>
-              <a:t>7/27/2020</a:t>
+              <a:t>7/28/2020</a:t>
             </a:fld>
             <a:endParaRPr lang="en-US"/>
           </a:p>
@@ -1729,7 +1733,7 @@
           <a:p>
             <a:fld id="{1E7D160D-1039-4FD1-888D-FE7CCB4BB5CF}" type="datetimeFigureOut">
               <a:rPr lang="en-US" smtClean="0"/>
-              <a:t>7/27/2020</a:t>
+              <a:t>7/28/2020</a:t>
             </a:fld>
             <a:endParaRPr lang="en-US"/>
           </a:p>
@@ -1824,7 +1828,7 @@
           <a:p>
             <a:fld id="{1E7D160D-1039-4FD1-888D-FE7CCB4BB5CF}" type="datetimeFigureOut">
               <a:rPr lang="en-US" smtClean="0"/>
-              <a:t>7/27/2020</a:t>
+              <a:t>7/28/2020</a:t>
             </a:fld>
             <a:endParaRPr lang="en-US"/>
           </a:p>
@@ -2101,7 +2105,7 @@
           <a:p>
             <a:fld id="{1E7D160D-1039-4FD1-888D-FE7CCB4BB5CF}" type="datetimeFigureOut">
               <a:rPr lang="en-US" smtClean="0"/>
-              <a:t>7/27/2020</a:t>
+              <a:t>7/28/2020</a:t>
             </a:fld>
             <a:endParaRPr lang="en-US"/>
           </a:p>
@@ -2354,7 +2358,7 @@
           <a:p>
             <a:fld id="{1E7D160D-1039-4FD1-888D-FE7CCB4BB5CF}" type="datetimeFigureOut">
               <a:rPr lang="en-US" smtClean="0"/>
-              <a:t>7/27/2020</a:t>
+              <a:t>7/28/2020</a:t>
             </a:fld>
             <a:endParaRPr lang="en-US"/>
           </a:p>
@@ -2567,7 +2571,7 @@
           <a:p>
             <a:fld id="{1E7D160D-1039-4FD1-888D-FE7CCB4BB5CF}" type="datetimeFigureOut">
               <a:rPr lang="en-US" smtClean="0"/>
-              <a:t>7/27/2020</a:t>
+              <a:t>7/28/2020</a:t>
             </a:fld>
             <a:endParaRPr lang="en-US"/>
           </a:p>
@@ -3503,15 +3507,15 @@
         </p:blipFill>
         <p:spPr>
           <a:xfrm>
-            <a:off x="91598" y="41565"/>
-            <a:ext cx="12021605" cy="6758853"/>
+            <a:off x="126021" y="69275"/>
+            <a:ext cx="11931766" cy="6708343"/>
           </a:xfrm>
         </p:spPr>
       </p:pic>
     </p:spTree>
     <p:extLst>
       <p:ext uri="{BB962C8B-B14F-4D97-AF65-F5344CB8AC3E}">
-        <p14:creationId xmlns:p14="http://schemas.microsoft.com/office/powerpoint/2010/main" val="2012243837"/>
+        <p14:creationId xmlns:p14="http://schemas.microsoft.com/office/powerpoint/2010/main" val="145355349"/>
       </p:ext>
     </p:extLst>
   </p:cSld>
@@ -3559,7 +3563,7 @@
       </p:sp>
       <p:pic>
         <p:nvPicPr>
-          <p:cNvPr id="4" name="Content Placeholder 3"/>
+          <p:cNvPr id="7" name="Content Placeholder 6"/>
           <p:cNvPicPr>
             <a:picLocks noGrp="1" noChangeAspect="1"/>
           </p:cNvPicPr>
@@ -3581,86 +3585,8 @@
         </p:blipFill>
         <p:spPr>
           <a:xfrm>
-            <a:off x="126021" y="69275"/>
-            <a:ext cx="11931766" cy="6708343"/>
-          </a:xfrm>
-        </p:spPr>
-      </p:pic>
-    </p:spTree>
-    <p:extLst>
-      <p:ext uri="{BB962C8B-B14F-4D97-AF65-F5344CB8AC3E}">
-        <p14:creationId xmlns:p14="http://schemas.microsoft.com/office/powerpoint/2010/main" val="145355349"/>
-      </p:ext>
-    </p:extLst>
-  </p:cSld>
-  <p:clrMapOvr>
-    <a:masterClrMapping/>
-  </p:clrMapOvr>
-</p:sld>
-</file>
-
-<file path=ppt/slides/slide9.xml><?xml version="1.0" encoding="utf-8"?>
-<p:sld xmlns:a="http://schemas.openxmlformats.org/drawingml/2006/main" xmlns:r="http://schemas.openxmlformats.org/officeDocument/2006/relationships" xmlns:p="http://schemas.openxmlformats.org/presentationml/2006/main">
-  <p:cSld>
-    <p:spTree>
-      <p:nvGrpSpPr>
-        <p:cNvPr id="1" name=""/>
-        <p:cNvGrpSpPr/>
-        <p:nvPr/>
-      </p:nvGrpSpPr>
-      <p:grpSpPr>
-        <a:xfrm>
-          <a:off x="0" y="0"/>
-          <a:ext cx="0" cy="0"/>
-          <a:chOff x="0" y="0"/>
-          <a:chExt cx="0" cy="0"/>
-        </a:xfrm>
-      </p:grpSpPr>
-      <p:sp>
-        <p:nvSpPr>
-          <p:cNvPr id="2" name="Title 1"/>
-          <p:cNvSpPr>
-            <a:spLocks noGrp="1"/>
-          </p:cNvSpPr>
-          <p:nvPr>
-            <p:ph type="title"/>
-          </p:nvPr>
-        </p:nvSpPr>
-        <p:spPr/>
-        <p:txBody>
-          <a:bodyPr/>
-          <a:lstStyle/>
-          <a:p>
-            <a:endParaRPr lang="en-US"/>
-          </a:p>
-        </p:txBody>
-      </p:sp>
-      <p:pic>
-        <p:nvPicPr>
-          <p:cNvPr id="4" name="Content Placeholder 3"/>
-          <p:cNvPicPr>
-            <a:picLocks noGrp="1" noChangeAspect="1"/>
-          </p:cNvPicPr>
-          <p:nvPr>
-            <p:ph idx="1"/>
-          </p:nvPr>
-        </p:nvPicPr>
-        <p:blipFill>
-          <a:blip r:embed="rId2">
-            <a:extLst>
-              <a:ext uri="{28A0092B-C50C-407E-A947-70E740481C1C}">
-                <a14:useLocalDpi xmlns:a14="http://schemas.microsoft.com/office/drawing/2010/main" val="0"/>
-              </a:ext>
-            </a:extLst>
-          </a:blip>
-          <a:stretch>
-            <a:fillRect/>
-          </a:stretch>
-        </p:blipFill>
-        <p:spPr>
-          <a:xfrm>
-            <a:off x="131896" y="83125"/>
-            <a:ext cx="11902245" cy="6691745"/>
+            <a:off x="83120" y="198303"/>
+            <a:ext cx="12036520" cy="6463567"/>
           </a:xfrm>
         </p:spPr>
       </p:pic>

</xml_diff>